<commit_message>
added display expense components
</commit_message>
<xml_diff>
--- a/PowerPoint_notes/Section 3 React Basics and Working With Components.pptx
+++ b/PowerPoint_notes/Section 3 React Basics and Working With Components.pptx
@@ -7,6 +7,8 @@
   <p:sldIdLst>
     <p:sldId id="256" r:id="rId2"/>
     <p:sldId id="257" r:id="rId3"/>
+    <p:sldId id="258" r:id="rId4"/>
+    <p:sldId id="259" r:id="rId5"/>
   </p:sldIdLst>
   <p:sldSz cx="12192000" cy="6858000"/>
   <p:notesSz cx="6858000" cy="9144000"/>
@@ -105,11 +107,71 @@
       </a:defRPr>
     </a:lvl9pPr>
   </p:defaultTextStyle>
+  <p:extLst>
+    <p:ext uri="{EFAFB233-063F-42B5-8137-9DF3F51BA10A}">
+      <p15:sldGuideLst xmlns:p15="http://schemas.microsoft.com/office/powerpoint/2012/main"/>
+    </p:ext>
+  </p:extLst>
 </p:presentation>
 </file>
 
 <file path=ppt/changesInfos/changesInfo1.xml><?xml version="1.0" encoding="utf-8"?>
 <pc:chgInfo xmlns:a="http://schemas.openxmlformats.org/drawingml/2006/main" xmlns:r="http://schemas.openxmlformats.org/officeDocument/2006/relationships" xmlns:ac="http://schemas.microsoft.com/office/drawing/2013/main/command" xmlns:pc="http://schemas.microsoft.com/office/powerpoint/2013/main/command">
+  <pc:docChgLst>
+    <pc:chgData name="andy.chhuon@outlook.com" userId="33db6a65a16e5d52" providerId="LiveId" clId="{92CE4C02-33C2-4663-A4D6-7A163BA3A15C}"/>
+    <pc:docChg chg="undo custSel addSld modSld">
+      <pc:chgData name="andy.chhuon@outlook.com" userId="33db6a65a16e5d52" providerId="LiveId" clId="{92CE4C02-33C2-4663-A4D6-7A163BA3A15C}" dt="2021-12-21T15:51:21.400" v="474" actId="20577"/>
+      <pc:docMkLst>
+        <pc:docMk/>
+      </pc:docMkLst>
+      <pc:sldChg chg="modSp new mod">
+        <pc:chgData name="andy.chhuon@outlook.com" userId="33db6a65a16e5d52" providerId="LiveId" clId="{92CE4C02-33C2-4663-A4D6-7A163BA3A15C}" dt="2021-12-21T15:36:58.209" v="297" actId="20577"/>
+        <pc:sldMkLst>
+          <pc:docMk/>
+          <pc:sldMk cId="4140364563" sldId="258"/>
+        </pc:sldMkLst>
+        <pc:spChg chg="mod">
+          <ac:chgData name="andy.chhuon@outlook.com" userId="33db6a65a16e5d52" providerId="LiveId" clId="{92CE4C02-33C2-4663-A4D6-7A163BA3A15C}" dt="2021-12-21T15:13:49.889" v="11" actId="20577"/>
+          <ac:spMkLst>
+            <pc:docMk/>
+            <pc:sldMk cId="4140364563" sldId="258"/>
+            <ac:spMk id="2" creationId="{9157D497-88A6-4E6B-98F1-989C789A90AE}"/>
+          </ac:spMkLst>
+        </pc:spChg>
+        <pc:spChg chg="mod">
+          <ac:chgData name="andy.chhuon@outlook.com" userId="33db6a65a16e5d52" providerId="LiveId" clId="{92CE4C02-33C2-4663-A4D6-7A163BA3A15C}" dt="2021-12-21T15:36:58.209" v="297" actId="20577"/>
+          <ac:spMkLst>
+            <pc:docMk/>
+            <pc:sldMk cId="4140364563" sldId="258"/>
+            <ac:spMk id="3" creationId="{0E8F2D1C-4FAB-428E-9965-4E63F9C2D286}"/>
+          </ac:spMkLst>
+        </pc:spChg>
+      </pc:sldChg>
+      <pc:sldChg chg="modSp new mod">
+        <pc:chgData name="andy.chhuon@outlook.com" userId="33db6a65a16e5d52" providerId="LiveId" clId="{92CE4C02-33C2-4663-A4D6-7A163BA3A15C}" dt="2021-12-21T15:51:21.400" v="474" actId="20577"/>
+        <pc:sldMkLst>
+          <pc:docMk/>
+          <pc:sldMk cId="1945974417" sldId="259"/>
+        </pc:sldMkLst>
+        <pc:spChg chg="mod">
+          <ac:chgData name="andy.chhuon@outlook.com" userId="33db6a65a16e5d52" providerId="LiveId" clId="{92CE4C02-33C2-4663-A4D6-7A163BA3A15C}" dt="2021-12-21T15:48:46.615" v="325" actId="20577"/>
+          <ac:spMkLst>
+            <pc:docMk/>
+            <pc:sldMk cId="1945974417" sldId="259"/>
+            <ac:spMk id="2" creationId="{29BB4AF5-DF5C-4B3D-A245-091F769066D8}"/>
+          </ac:spMkLst>
+        </pc:spChg>
+        <pc:spChg chg="mod">
+          <ac:chgData name="andy.chhuon@outlook.com" userId="33db6a65a16e5d52" providerId="LiveId" clId="{92CE4C02-33C2-4663-A4D6-7A163BA3A15C}" dt="2021-12-21T15:51:21.400" v="474" actId="20577"/>
+          <ac:spMkLst>
+            <pc:docMk/>
+            <pc:sldMk cId="1945974417" sldId="259"/>
+            <ac:spMk id="3" creationId="{ADBC5833-AA67-4438-A864-896CF22408AF}"/>
+          </ac:spMkLst>
+        </pc:spChg>
+      </pc:sldChg>
+    </pc:docChg>
+  </pc:docChgLst>
   <pc:docChgLst>
     <pc:chgData name="andy.chhuon@outlook.com" userId="33db6a65a16e5d52" providerId="LiveId" clId="{0ADEC97A-DCEC-4282-8C22-6023F97FBE71}"/>
     <pc:docChg chg="custSel modSld">
@@ -323,7 +385,7 @@
           <a:p>
             <a:fld id="{33A66D3C-47B8-4152-8BF5-87717502A2D8}" type="datetimeFigureOut">
               <a:rPr lang="en-CA" smtClean="0"/>
-              <a:t>2021-12-20</a:t>
+              <a:t>2021-12-21</a:t>
             </a:fld>
             <a:endParaRPr lang="en-CA"/>
           </a:p>
@@ -598,7 +660,7 @@
           <a:p>
             <a:fld id="{33A66D3C-47B8-4152-8BF5-87717502A2D8}" type="datetimeFigureOut">
               <a:rPr lang="en-CA" smtClean="0"/>
-              <a:t>2021-12-20</a:t>
+              <a:t>2021-12-21</a:t>
             </a:fld>
             <a:endParaRPr lang="en-CA"/>
           </a:p>
@@ -792,7 +854,7 @@
           <a:p>
             <a:fld id="{33A66D3C-47B8-4152-8BF5-87717502A2D8}" type="datetimeFigureOut">
               <a:rPr lang="en-CA" smtClean="0"/>
-              <a:t>2021-12-20</a:t>
+              <a:t>2021-12-21</a:t>
             </a:fld>
             <a:endParaRPr lang="en-CA"/>
           </a:p>
@@ -1065,7 +1127,7 @@
           <a:p>
             <a:fld id="{33A66D3C-47B8-4152-8BF5-87717502A2D8}" type="datetimeFigureOut">
               <a:rPr lang="en-CA" smtClean="0"/>
-              <a:t>2021-12-20</a:t>
+              <a:t>2021-12-21</a:t>
             </a:fld>
             <a:endParaRPr lang="en-CA"/>
           </a:p>
@@ -1406,7 +1468,7 @@
           <a:p>
             <a:fld id="{33A66D3C-47B8-4152-8BF5-87717502A2D8}" type="datetimeFigureOut">
               <a:rPr lang="en-CA" smtClean="0"/>
-              <a:t>2021-12-20</a:t>
+              <a:t>2021-12-21</a:t>
             </a:fld>
             <a:endParaRPr lang="en-CA"/>
           </a:p>
@@ -2029,7 +2091,7 @@
           <a:p>
             <a:fld id="{33A66D3C-47B8-4152-8BF5-87717502A2D8}" type="datetimeFigureOut">
               <a:rPr lang="en-CA" smtClean="0"/>
-              <a:t>2021-12-20</a:t>
+              <a:t>2021-12-21</a:t>
             </a:fld>
             <a:endParaRPr lang="en-CA"/>
           </a:p>
@@ -2889,7 +2951,7 @@
           <a:p>
             <a:fld id="{33A66D3C-47B8-4152-8BF5-87717502A2D8}" type="datetimeFigureOut">
               <a:rPr lang="en-CA" smtClean="0"/>
-              <a:t>2021-12-20</a:t>
+              <a:t>2021-12-21</a:t>
             </a:fld>
             <a:endParaRPr lang="en-CA"/>
           </a:p>
@@ -3059,7 +3121,7 @@
           <a:p>
             <a:fld id="{33A66D3C-47B8-4152-8BF5-87717502A2D8}" type="datetimeFigureOut">
               <a:rPr lang="en-CA" smtClean="0"/>
-              <a:t>2021-12-20</a:t>
+              <a:t>2021-12-21</a:t>
             </a:fld>
             <a:endParaRPr lang="en-CA"/>
           </a:p>
@@ -3239,7 +3301,7 @@
           <a:p>
             <a:fld id="{33A66D3C-47B8-4152-8BF5-87717502A2D8}" type="datetimeFigureOut">
               <a:rPr lang="en-CA" smtClean="0"/>
-              <a:t>2021-12-20</a:t>
+              <a:t>2021-12-21</a:t>
             </a:fld>
             <a:endParaRPr lang="en-CA"/>
           </a:p>
@@ -3409,7 +3471,7 @@
           <a:p>
             <a:fld id="{33A66D3C-47B8-4152-8BF5-87717502A2D8}" type="datetimeFigureOut">
               <a:rPr lang="en-CA" smtClean="0"/>
-              <a:t>2021-12-20</a:t>
+              <a:t>2021-12-21</a:t>
             </a:fld>
             <a:endParaRPr lang="en-CA"/>
           </a:p>
@@ -3656,7 +3718,7 @@
           <a:p>
             <a:fld id="{33A66D3C-47B8-4152-8BF5-87717502A2D8}" type="datetimeFigureOut">
               <a:rPr lang="en-CA" smtClean="0"/>
-              <a:t>2021-12-20</a:t>
+              <a:t>2021-12-21</a:t>
             </a:fld>
             <a:endParaRPr lang="en-CA"/>
           </a:p>
@@ -3948,7 +4010,7 @@
           <a:p>
             <a:fld id="{33A66D3C-47B8-4152-8BF5-87717502A2D8}" type="datetimeFigureOut">
               <a:rPr lang="en-CA" smtClean="0"/>
-              <a:t>2021-12-20</a:t>
+              <a:t>2021-12-21</a:t>
             </a:fld>
             <a:endParaRPr lang="en-CA"/>
           </a:p>
@@ -4392,7 +4454,7 @@
           <a:p>
             <a:fld id="{33A66D3C-47B8-4152-8BF5-87717502A2D8}" type="datetimeFigureOut">
               <a:rPr lang="en-CA" smtClean="0"/>
-              <a:t>2021-12-20</a:t>
+              <a:t>2021-12-21</a:t>
             </a:fld>
             <a:endParaRPr lang="en-CA"/>
           </a:p>
@@ -4510,7 +4572,7 @@
           <a:p>
             <a:fld id="{33A66D3C-47B8-4152-8BF5-87717502A2D8}" type="datetimeFigureOut">
               <a:rPr lang="en-CA" smtClean="0"/>
-              <a:t>2021-12-20</a:t>
+              <a:t>2021-12-21</a:t>
             </a:fld>
             <a:endParaRPr lang="en-CA"/>
           </a:p>
@@ -4605,7 +4667,7 @@
           <a:p>
             <a:fld id="{33A66D3C-47B8-4152-8BF5-87717502A2D8}" type="datetimeFigureOut">
               <a:rPr lang="en-CA" smtClean="0"/>
-              <a:t>2021-12-20</a:t>
+              <a:t>2021-12-21</a:t>
             </a:fld>
             <a:endParaRPr lang="en-CA"/>
           </a:p>
@@ -4884,7 +4946,7 @@
           <a:p>
             <a:fld id="{33A66D3C-47B8-4152-8BF5-87717502A2D8}" type="datetimeFigureOut">
               <a:rPr lang="en-CA" smtClean="0"/>
-              <a:t>2021-12-20</a:t>
+              <a:t>2021-12-21</a:t>
             </a:fld>
             <a:endParaRPr lang="en-CA"/>
           </a:p>
@@ -5159,7 +5221,7 @@
           <a:p>
             <a:fld id="{33A66D3C-47B8-4152-8BF5-87717502A2D8}" type="datetimeFigureOut">
               <a:rPr lang="en-CA" smtClean="0"/>
-              <a:t>2021-12-20</a:t>
+              <a:t>2021-12-21</a:t>
             </a:fld>
             <a:endParaRPr lang="en-CA"/>
           </a:p>
@@ -5588,7 +5650,7 @@
           <a:p>
             <a:fld id="{33A66D3C-47B8-4152-8BF5-87717502A2D8}" type="datetimeFigureOut">
               <a:rPr lang="en-CA" smtClean="0"/>
-              <a:t>2021-12-20</a:t>
+              <a:t>2021-12-21</a:t>
             </a:fld>
             <a:endParaRPr lang="en-CA"/>
           </a:p>
@@ -6433,11 +6495,124 @@
             </a:r>
             <a:r>
               <a:rPr lang="fr-CA" dirty="0"/>
-              <a:t> about </a:t>
+              <a:t> about DOM instructions) – </a:t>
+            </a:r>
+            <a:r>
+              <a:rPr lang="fr-CA" dirty="0" err="1"/>
+              <a:t>allows</a:t>
+            </a:r>
+            <a:r>
+              <a:rPr lang="fr-CA" dirty="0"/>
+              <a:t> html blocks in javascript</a:t>
+            </a:r>
+          </a:p>
+          <a:p>
+            <a:r>
+              <a:rPr lang="fr-CA" dirty="0"/>
+              <a:t>Vs </a:t>
+            </a:r>
+            <a:r>
+              <a:rPr lang="fr-CA" dirty="0" err="1"/>
+              <a:t>imperative</a:t>
+            </a:r>
+            <a:r>
+              <a:rPr lang="fr-CA" dirty="0"/>
+              <a:t> </a:t>
+            </a:r>
+            <a:r>
+              <a:rPr lang="fr-CA" dirty="0" err="1"/>
+              <a:t>approach</a:t>
+            </a:r>
+            <a:r>
+              <a:rPr lang="fr-CA" dirty="0"/>
+              <a:t>: </a:t>
+            </a:r>
+            <a:r>
+              <a:rPr lang="fr-CA" dirty="0" err="1"/>
+              <a:t>creatElement</a:t>
+            </a:r>
+            <a:r>
+              <a:rPr lang="fr-CA" dirty="0"/>
+              <a:t>, </a:t>
+            </a:r>
+            <a:r>
+              <a:rPr lang="fr-CA" dirty="0" err="1"/>
+              <a:t>getElementById</a:t>
+            </a:r>
+            <a:endParaRPr lang="fr-CA" dirty="0"/>
+          </a:p>
+          <a:p>
+            <a:r>
+              <a:rPr lang="fr-CA" dirty="0"/>
+              <a:t>Components must start </a:t>
+            </a:r>
+            <a:r>
+              <a:rPr lang="fr-CA" dirty="0" err="1"/>
+              <a:t>with</a:t>
+            </a:r>
+            <a:r>
+              <a:rPr lang="fr-CA" dirty="0"/>
+              <a:t> </a:t>
+            </a:r>
+            <a:r>
+              <a:rPr lang="fr-CA" dirty="0" err="1"/>
+              <a:t>uppercase</a:t>
+            </a:r>
+            <a:r>
+              <a:rPr lang="fr-CA" dirty="0"/>
+              <a:t>. </a:t>
+            </a:r>
+            <a:r>
+              <a:rPr lang="fr-CA" dirty="0" err="1"/>
+              <a:t>React</a:t>
+            </a:r>
+            <a:r>
+              <a:rPr lang="fr-CA" dirty="0"/>
+              <a:t> </a:t>
+            </a:r>
+            <a:r>
+              <a:rPr lang="fr-CA" dirty="0" err="1"/>
+              <a:t>thinks</a:t>
+            </a:r>
+            <a:r>
+              <a:rPr lang="fr-CA" dirty="0"/>
+              <a:t> </a:t>
+            </a:r>
+            <a:r>
+              <a:rPr lang="fr-CA" dirty="0" err="1"/>
+              <a:t>lowercase</a:t>
+            </a:r>
+            <a:r>
+              <a:rPr lang="fr-CA" dirty="0"/>
+              <a:t> are </a:t>
+            </a:r>
+            <a:r>
+              <a:rPr lang="fr-CA" dirty="0" err="1"/>
+              <a:t>built</a:t>
+            </a:r>
+            <a:r>
+              <a:rPr lang="fr-CA" dirty="0"/>
+              <a:t> in </a:t>
+            </a:r>
+            <a:r>
+              <a:rPr lang="fr-CA" dirty="0" err="1"/>
+              <a:t>elements</a:t>
+            </a:r>
+            <a:r>
+              <a:rPr lang="fr-CA" dirty="0"/>
+              <a:t> and </a:t>
+            </a:r>
+            <a:r>
+              <a:rPr lang="fr-CA" dirty="0" err="1"/>
+              <a:t>uppercase</a:t>
+            </a:r>
+            <a:r>
+              <a:rPr lang="fr-CA" dirty="0"/>
+              <a:t> </a:t>
             </a:r>
             <a:r>
               <a:rPr lang="fr-CA"/>
-              <a:t>DOM instructions)</a:t>
+              <a:t>are custom</a:t>
             </a:r>
             <a:endParaRPr lang="en-CA" dirty="0"/>
           </a:p>
@@ -6447,6 +6622,749 @@
     <p:extLst>
       <p:ext uri="{BB962C8B-B14F-4D97-AF65-F5344CB8AC3E}">
         <p14:creationId xmlns:p14="http://schemas.microsoft.com/office/powerpoint/2010/main" val="3482830235"/>
+      </p:ext>
+    </p:extLst>
+  </p:cSld>
+  <p:clrMapOvr>
+    <a:masterClrMapping/>
+  </p:clrMapOvr>
+</p:sld>
+</file>
+
+<file path=ppt/slides/slide3.xml><?xml version="1.0" encoding="utf-8"?>
+<p:sld xmlns:a="http://schemas.openxmlformats.org/drawingml/2006/main" xmlns:r="http://schemas.openxmlformats.org/officeDocument/2006/relationships" xmlns:p="http://schemas.openxmlformats.org/presentationml/2006/main">
+  <p:cSld>
+    <p:spTree>
+      <p:nvGrpSpPr>
+        <p:cNvPr id="1" name=""/>
+        <p:cNvGrpSpPr/>
+        <p:nvPr/>
+      </p:nvGrpSpPr>
+      <p:grpSpPr>
+        <a:xfrm>
+          <a:off x="0" y="0"/>
+          <a:ext cx="0" cy="0"/>
+          <a:chOff x="0" y="0"/>
+          <a:chExt cx="0" cy="0"/>
+        </a:xfrm>
+      </p:grpSpPr>
+      <p:sp>
+        <p:nvSpPr>
+          <p:cNvPr id="2" name="Title 1">
+            <a:extLst>
+              <a:ext uri="{FF2B5EF4-FFF2-40B4-BE49-F238E27FC236}">
+                <a16:creationId xmlns:a16="http://schemas.microsoft.com/office/drawing/2014/main" id="{9157D497-88A6-4E6B-98F1-989C789A90AE}"/>
+              </a:ext>
+            </a:extLst>
+          </p:cNvPr>
+          <p:cNvSpPr>
+            <a:spLocks noGrp="1"/>
+          </p:cNvSpPr>
+          <p:nvPr>
+            <p:ph type="title"/>
+          </p:nvPr>
+        </p:nvSpPr>
+        <p:spPr>
+          <a:xfrm>
+            <a:off x="646112" y="452718"/>
+            <a:ext cx="9403742" cy="839369"/>
+          </a:xfrm>
+        </p:spPr>
+        <p:txBody>
+          <a:bodyPr/>
+          <a:lstStyle/>
+          <a:p>
+            <a:r>
+              <a:rPr lang="en-US" dirty="0"/>
+              <a:t>Components</a:t>
+            </a:r>
+            <a:endParaRPr lang="en-CA" dirty="0"/>
+          </a:p>
+        </p:txBody>
+      </p:sp>
+      <p:sp>
+        <p:nvSpPr>
+          <p:cNvPr id="3" name="Content Placeholder 2">
+            <a:extLst>
+              <a:ext uri="{FF2B5EF4-FFF2-40B4-BE49-F238E27FC236}">
+                <a16:creationId xmlns:a16="http://schemas.microsoft.com/office/drawing/2014/main" id="{0E8F2D1C-4FAB-428E-9965-4E63F9C2D286}"/>
+              </a:ext>
+            </a:extLst>
+          </p:cNvPr>
+          <p:cNvSpPr>
+            <a:spLocks noGrp="1"/>
+          </p:cNvSpPr>
+          <p:nvPr>
+            <p:ph idx="1"/>
+          </p:nvPr>
+        </p:nvSpPr>
+        <p:spPr>
+          <a:xfrm>
+            <a:off x="1103312" y="1222512"/>
+            <a:ext cx="8946541" cy="5025887"/>
+          </a:xfrm>
+        </p:spPr>
+        <p:txBody>
+          <a:bodyPr/>
+          <a:lstStyle/>
+          <a:p>
+            <a:r>
+              <a:rPr lang="en-US" dirty="0"/>
+              <a:t>Only one root element per component (per JSX)</a:t>
+            </a:r>
+          </a:p>
+          <a:p>
+            <a:r>
+              <a:rPr lang="en-US" dirty="0"/>
+              <a:t>Can wrap everything in one div </a:t>
+            </a:r>
+            <a:endParaRPr lang="en-CA" dirty="0"/>
+          </a:p>
+          <a:p>
+            <a:r>
+              <a:rPr lang="en-CA" dirty="0"/>
+              <a:t>Use </a:t>
+            </a:r>
+            <a:r>
+              <a:rPr lang="en-CA" dirty="0" err="1"/>
+              <a:t>className</a:t>
+            </a:r>
+            <a:r>
+              <a:rPr lang="en-CA" dirty="0"/>
+              <a:t> = “” instead of class = “” because class is a reserved keyword in JS</a:t>
+            </a:r>
+          </a:p>
+          <a:p>
+            <a:r>
+              <a:rPr lang="en-CA" dirty="0"/>
+              <a:t>Use {} to store </a:t>
+            </a:r>
+            <a:r>
+              <a:rPr lang="en-CA" dirty="0" err="1"/>
+              <a:t>javascript</a:t>
+            </a:r>
+            <a:r>
+              <a:rPr lang="en-CA" dirty="0"/>
+              <a:t> code or variables in component html</a:t>
+            </a:r>
+          </a:p>
+        </p:txBody>
+      </p:sp>
+    </p:spTree>
+    <p:extLst>
+      <p:ext uri="{BB962C8B-B14F-4D97-AF65-F5344CB8AC3E}">
+        <p14:creationId xmlns:p14="http://schemas.microsoft.com/office/powerpoint/2010/main" val="4140364563"/>
+      </p:ext>
+    </p:extLst>
+  </p:cSld>
+  <p:clrMapOvr>
+    <a:masterClrMapping/>
+  </p:clrMapOvr>
+</p:sld>
+</file>
+
+<file path=ppt/slides/slide4.xml><?xml version="1.0" encoding="utf-8"?>
+<p:sld xmlns:a="http://schemas.openxmlformats.org/drawingml/2006/main" xmlns:r="http://schemas.openxmlformats.org/officeDocument/2006/relationships" xmlns:p="http://schemas.openxmlformats.org/presentationml/2006/main">
+  <p:cSld>
+    <p:spTree>
+      <p:nvGrpSpPr>
+        <p:cNvPr id="1" name=""/>
+        <p:cNvGrpSpPr/>
+        <p:nvPr/>
+      </p:nvGrpSpPr>
+      <p:grpSpPr>
+        <a:xfrm>
+          <a:off x="0" y="0"/>
+          <a:ext cx="0" cy="0"/>
+          <a:chOff x="0" y="0"/>
+          <a:chExt cx="0" cy="0"/>
+        </a:xfrm>
+      </p:grpSpPr>
+      <p:sp>
+        <p:nvSpPr>
+          <p:cNvPr id="2" name="Title 1">
+            <a:extLst>
+              <a:ext uri="{FF2B5EF4-FFF2-40B4-BE49-F238E27FC236}">
+                <a16:creationId xmlns:a16="http://schemas.microsoft.com/office/drawing/2014/main" id="{29BB4AF5-DF5C-4B3D-A245-091F769066D8}"/>
+              </a:ext>
+            </a:extLst>
+          </p:cNvPr>
+          <p:cNvSpPr>
+            <a:spLocks noGrp="1"/>
+          </p:cNvSpPr>
+          <p:nvPr>
+            <p:ph type="title"/>
+          </p:nvPr>
+        </p:nvSpPr>
+        <p:spPr>
+          <a:xfrm>
+            <a:off x="646111" y="452718"/>
+            <a:ext cx="9404723" cy="869186"/>
+          </a:xfrm>
+        </p:spPr>
+        <p:txBody>
+          <a:bodyPr/>
+          <a:lstStyle/>
+          <a:p>
+            <a:r>
+              <a:rPr lang="en-CA" dirty="0"/>
+              <a:t>Passing data via props</a:t>
+            </a:r>
+          </a:p>
+        </p:txBody>
+      </p:sp>
+      <p:sp>
+        <p:nvSpPr>
+          <p:cNvPr id="3" name="Content Placeholder 2">
+            <a:extLst>
+              <a:ext uri="{FF2B5EF4-FFF2-40B4-BE49-F238E27FC236}">
+                <a16:creationId xmlns:a16="http://schemas.microsoft.com/office/drawing/2014/main" id="{ADBC5833-AA67-4438-A864-896CF22408AF}"/>
+              </a:ext>
+            </a:extLst>
+          </p:cNvPr>
+          <p:cNvSpPr>
+            <a:spLocks noGrp="1"/>
+          </p:cNvSpPr>
+          <p:nvPr>
+            <p:ph idx="1"/>
+          </p:nvPr>
+        </p:nvSpPr>
+        <p:spPr>
+          <a:xfrm>
+            <a:off x="1103312" y="1321904"/>
+            <a:ext cx="8946541" cy="4926495"/>
+          </a:xfrm>
+        </p:spPr>
+        <p:txBody>
+          <a:bodyPr/>
+          <a:lstStyle/>
+          <a:p>
+            <a:r>
+              <a:rPr lang="en-CA" dirty="0"/>
+              <a:t>Input data as attributes (</a:t>
+            </a:r>
+            <a:r>
+              <a:rPr lang="en-CA" dirty="0" err="1"/>
+              <a:t>ie</a:t>
+            </a:r>
+            <a:endParaRPr lang="en-CA" dirty="0"/>
+          </a:p>
+          <a:p>
+            <a:pPr marL="0" indent="0">
+              <a:buNone/>
+            </a:pPr>
+            <a:r>
+              <a:rPr lang="en-US" b="0" dirty="0">
+                <a:solidFill>
+                  <a:srgbClr val="D4D4D4"/>
+                </a:solidFill>
+                <a:effectLst/>
+                <a:latin typeface="Consolas" panose="020B0609020204030204" pitchFamily="49" charset="0"/>
+              </a:rPr>
+              <a:t>      </a:t>
+            </a:r>
+            <a:r>
+              <a:rPr lang="en-US" b="0" dirty="0">
+                <a:solidFill>
+                  <a:srgbClr val="808080"/>
+                </a:solidFill>
+                <a:effectLst/>
+                <a:latin typeface="Consolas" panose="020B0609020204030204" pitchFamily="49" charset="0"/>
+              </a:rPr>
+              <a:t>&lt;</a:t>
+            </a:r>
+            <a:r>
+              <a:rPr lang="en-US" b="0" dirty="0" err="1">
+                <a:solidFill>
+                  <a:srgbClr val="4EC9B0"/>
+                </a:solidFill>
+                <a:effectLst/>
+                <a:latin typeface="Consolas" panose="020B0609020204030204" pitchFamily="49" charset="0"/>
+              </a:rPr>
+              <a:t>ExpenseItem</a:t>
+            </a:r>
+            <a:endParaRPr lang="en-US" b="0" dirty="0">
+              <a:solidFill>
+                <a:srgbClr val="D4D4D4"/>
+              </a:solidFill>
+              <a:effectLst/>
+              <a:latin typeface="Consolas" panose="020B0609020204030204" pitchFamily="49" charset="0"/>
+            </a:endParaRPr>
+          </a:p>
+          <a:p>
+            <a:pPr marL="0" indent="0">
+              <a:buNone/>
+            </a:pPr>
+            <a:r>
+              <a:rPr lang="en-US" b="0" dirty="0">
+                <a:solidFill>
+                  <a:srgbClr val="D4D4D4"/>
+                </a:solidFill>
+                <a:effectLst/>
+                <a:latin typeface="Consolas" panose="020B0609020204030204" pitchFamily="49" charset="0"/>
+              </a:rPr>
+              <a:t>        </a:t>
+            </a:r>
+            <a:r>
+              <a:rPr lang="en-US" b="0" dirty="0">
+                <a:solidFill>
+                  <a:srgbClr val="9CDCFE"/>
+                </a:solidFill>
+                <a:effectLst/>
+                <a:latin typeface="Consolas" panose="020B0609020204030204" pitchFamily="49" charset="0"/>
+              </a:rPr>
+              <a:t>title</a:t>
+            </a:r>
+            <a:r>
+              <a:rPr lang="en-US" b="0" dirty="0">
+                <a:solidFill>
+                  <a:srgbClr val="D4D4D4"/>
+                </a:solidFill>
+                <a:effectLst/>
+                <a:latin typeface="Consolas" panose="020B0609020204030204" pitchFamily="49" charset="0"/>
+              </a:rPr>
+              <a:t>=</a:t>
+            </a:r>
+            <a:r>
+              <a:rPr lang="en-US" b="0" dirty="0">
+                <a:solidFill>
+                  <a:srgbClr val="569CD6"/>
+                </a:solidFill>
+                <a:effectLst/>
+                <a:latin typeface="Consolas" panose="020B0609020204030204" pitchFamily="49" charset="0"/>
+              </a:rPr>
+              <a:t>{</a:t>
+            </a:r>
+            <a:r>
+              <a:rPr lang="en-US" b="0" dirty="0">
+                <a:solidFill>
+                  <a:srgbClr val="4FC1FF"/>
+                </a:solidFill>
+                <a:effectLst/>
+                <a:latin typeface="Consolas" panose="020B0609020204030204" pitchFamily="49" charset="0"/>
+              </a:rPr>
+              <a:t>expenses</a:t>
+            </a:r>
+            <a:r>
+              <a:rPr lang="en-US" b="0" dirty="0">
+                <a:solidFill>
+                  <a:srgbClr val="D4D4D4"/>
+                </a:solidFill>
+                <a:effectLst/>
+                <a:latin typeface="Consolas" panose="020B0609020204030204" pitchFamily="49" charset="0"/>
+              </a:rPr>
+              <a:t>[</a:t>
+            </a:r>
+            <a:r>
+              <a:rPr lang="en-US" b="0" dirty="0">
+                <a:solidFill>
+                  <a:srgbClr val="B5CEA8"/>
+                </a:solidFill>
+                <a:effectLst/>
+                <a:latin typeface="Consolas" panose="020B0609020204030204" pitchFamily="49" charset="0"/>
+              </a:rPr>
+              <a:t>2</a:t>
+            </a:r>
+            <a:r>
+              <a:rPr lang="en-US" b="0" dirty="0">
+                <a:solidFill>
+                  <a:srgbClr val="D4D4D4"/>
+                </a:solidFill>
+                <a:effectLst/>
+                <a:latin typeface="Consolas" panose="020B0609020204030204" pitchFamily="49" charset="0"/>
+              </a:rPr>
+              <a:t>].</a:t>
+            </a:r>
+            <a:r>
+              <a:rPr lang="en-US" b="0" dirty="0">
+                <a:solidFill>
+                  <a:srgbClr val="9CDCFE"/>
+                </a:solidFill>
+                <a:effectLst/>
+                <a:latin typeface="Consolas" panose="020B0609020204030204" pitchFamily="49" charset="0"/>
+              </a:rPr>
+              <a:t>title</a:t>
+            </a:r>
+            <a:r>
+              <a:rPr lang="en-US" b="0" dirty="0">
+                <a:solidFill>
+                  <a:srgbClr val="569CD6"/>
+                </a:solidFill>
+                <a:effectLst/>
+                <a:latin typeface="Consolas" panose="020B0609020204030204" pitchFamily="49" charset="0"/>
+              </a:rPr>
+              <a:t>}</a:t>
+            </a:r>
+            <a:endParaRPr lang="en-US" b="0" dirty="0">
+              <a:solidFill>
+                <a:srgbClr val="D4D4D4"/>
+              </a:solidFill>
+              <a:effectLst/>
+              <a:latin typeface="Consolas" panose="020B0609020204030204" pitchFamily="49" charset="0"/>
+            </a:endParaRPr>
+          </a:p>
+          <a:p>
+            <a:pPr marL="0" indent="0">
+              <a:buNone/>
+            </a:pPr>
+            <a:r>
+              <a:rPr lang="en-US" b="0" dirty="0">
+                <a:solidFill>
+                  <a:srgbClr val="D4D4D4"/>
+                </a:solidFill>
+                <a:effectLst/>
+                <a:latin typeface="Consolas" panose="020B0609020204030204" pitchFamily="49" charset="0"/>
+              </a:rPr>
+              <a:t>        </a:t>
+            </a:r>
+            <a:r>
+              <a:rPr lang="en-US" b="0" dirty="0">
+                <a:solidFill>
+                  <a:srgbClr val="9CDCFE"/>
+                </a:solidFill>
+                <a:effectLst/>
+                <a:latin typeface="Consolas" panose="020B0609020204030204" pitchFamily="49" charset="0"/>
+              </a:rPr>
+              <a:t>amount</a:t>
+            </a:r>
+            <a:r>
+              <a:rPr lang="en-US" b="0" dirty="0">
+                <a:solidFill>
+                  <a:srgbClr val="D4D4D4"/>
+                </a:solidFill>
+                <a:effectLst/>
+                <a:latin typeface="Consolas" panose="020B0609020204030204" pitchFamily="49" charset="0"/>
+              </a:rPr>
+              <a:t>=</a:t>
+            </a:r>
+            <a:r>
+              <a:rPr lang="en-US" b="0" dirty="0">
+                <a:solidFill>
+                  <a:srgbClr val="569CD6"/>
+                </a:solidFill>
+                <a:effectLst/>
+                <a:latin typeface="Consolas" panose="020B0609020204030204" pitchFamily="49" charset="0"/>
+              </a:rPr>
+              <a:t>{</a:t>
+            </a:r>
+            <a:r>
+              <a:rPr lang="en-US" b="0" dirty="0">
+                <a:solidFill>
+                  <a:srgbClr val="4FC1FF"/>
+                </a:solidFill>
+                <a:effectLst/>
+                <a:latin typeface="Consolas" panose="020B0609020204030204" pitchFamily="49" charset="0"/>
+              </a:rPr>
+              <a:t>expenses</a:t>
+            </a:r>
+            <a:r>
+              <a:rPr lang="en-US" b="0" dirty="0">
+                <a:solidFill>
+                  <a:srgbClr val="D4D4D4"/>
+                </a:solidFill>
+                <a:effectLst/>
+                <a:latin typeface="Consolas" panose="020B0609020204030204" pitchFamily="49" charset="0"/>
+              </a:rPr>
+              <a:t>[</a:t>
+            </a:r>
+            <a:r>
+              <a:rPr lang="en-US" b="0" dirty="0">
+                <a:solidFill>
+                  <a:srgbClr val="B5CEA8"/>
+                </a:solidFill>
+                <a:effectLst/>
+                <a:latin typeface="Consolas" panose="020B0609020204030204" pitchFamily="49" charset="0"/>
+              </a:rPr>
+              <a:t>2</a:t>
+            </a:r>
+            <a:r>
+              <a:rPr lang="en-US" b="0" dirty="0">
+                <a:solidFill>
+                  <a:srgbClr val="D4D4D4"/>
+                </a:solidFill>
+                <a:effectLst/>
+                <a:latin typeface="Consolas" panose="020B0609020204030204" pitchFamily="49" charset="0"/>
+              </a:rPr>
+              <a:t>].</a:t>
+            </a:r>
+            <a:r>
+              <a:rPr lang="en-US" b="0" dirty="0">
+                <a:solidFill>
+                  <a:srgbClr val="9CDCFE"/>
+                </a:solidFill>
+                <a:effectLst/>
+                <a:latin typeface="Consolas" panose="020B0609020204030204" pitchFamily="49" charset="0"/>
+              </a:rPr>
+              <a:t>amount</a:t>
+            </a:r>
+            <a:r>
+              <a:rPr lang="en-US" b="0" dirty="0">
+                <a:solidFill>
+                  <a:srgbClr val="569CD6"/>
+                </a:solidFill>
+                <a:effectLst/>
+                <a:latin typeface="Consolas" panose="020B0609020204030204" pitchFamily="49" charset="0"/>
+              </a:rPr>
+              <a:t>}</a:t>
+            </a:r>
+            <a:endParaRPr lang="en-US" b="0" dirty="0">
+              <a:solidFill>
+                <a:srgbClr val="D4D4D4"/>
+              </a:solidFill>
+              <a:effectLst/>
+              <a:latin typeface="Consolas" panose="020B0609020204030204" pitchFamily="49" charset="0"/>
+            </a:endParaRPr>
+          </a:p>
+          <a:p>
+            <a:pPr marL="0" indent="0">
+              <a:buNone/>
+            </a:pPr>
+            <a:r>
+              <a:rPr lang="en-US" b="0" dirty="0">
+                <a:solidFill>
+                  <a:srgbClr val="D4D4D4"/>
+                </a:solidFill>
+                <a:effectLst/>
+                <a:latin typeface="Consolas" panose="020B0609020204030204" pitchFamily="49" charset="0"/>
+              </a:rPr>
+              <a:t>        </a:t>
+            </a:r>
+            <a:r>
+              <a:rPr lang="en-US" b="0" dirty="0">
+                <a:solidFill>
+                  <a:srgbClr val="9CDCFE"/>
+                </a:solidFill>
+                <a:effectLst/>
+                <a:latin typeface="Consolas" panose="020B0609020204030204" pitchFamily="49" charset="0"/>
+              </a:rPr>
+              <a:t>date</a:t>
+            </a:r>
+            <a:r>
+              <a:rPr lang="en-US" b="0" dirty="0">
+                <a:solidFill>
+                  <a:srgbClr val="D4D4D4"/>
+                </a:solidFill>
+                <a:effectLst/>
+                <a:latin typeface="Consolas" panose="020B0609020204030204" pitchFamily="49" charset="0"/>
+              </a:rPr>
+              <a:t>=</a:t>
+            </a:r>
+            <a:r>
+              <a:rPr lang="en-US" b="0" dirty="0">
+                <a:solidFill>
+                  <a:srgbClr val="569CD6"/>
+                </a:solidFill>
+                <a:effectLst/>
+                <a:latin typeface="Consolas" panose="020B0609020204030204" pitchFamily="49" charset="0"/>
+              </a:rPr>
+              <a:t>{</a:t>
+            </a:r>
+            <a:r>
+              <a:rPr lang="en-US" b="0" dirty="0">
+                <a:solidFill>
+                  <a:srgbClr val="4FC1FF"/>
+                </a:solidFill>
+                <a:effectLst/>
+                <a:latin typeface="Consolas" panose="020B0609020204030204" pitchFamily="49" charset="0"/>
+              </a:rPr>
+              <a:t>expenses</a:t>
+            </a:r>
+            <a:r>
+              <a:rPr lang="en-US" b="0" dirty="0">
+                <a:solidFill>
+                  <a:srgbClr val="D4D4D4"/>
+                </a:solidFill>
+                <a:effectLst/>
+                <a:latin typeface="Consolas" panose="020B0609020204030204" pitchFamily="49" charset="0"/>
+              </a:rPr>
+              <a:t>[</a:t>
+            </a:r>
+            <a:r>
+              <a:rPr lang="en-US" b="0" dirty="0">
+                <a:solidFill>
+                  <a:srgbClr val="B5CEA8"/>
+                </a:solidFill>
+                <a:effectLst/>
+                <a:latin typeface="Consolas" panose="020B0609020204030204" pitchFamily="49" charset="0"/>
+              </a:rPr>
+              <a:t>2</a:t>
+            </a:r>
+            <a:r>
+              <a:rPr lang="en-US" b="0" dirty="0">
+                <a:solidFill>
+                  <a:srgbClr val="D4D4D4"/>
+                </a:solidFill>
+                <a:effectLst/>
+                <a:latin typeface="Consolas" panose="020B0609020204030204" pitchFamily="49" charset="0"/>
+              </a:rPr>
+              <a:t>].</a:t>
+            </a:r>
+            <a:r>
+              <a:rPr lang="en-US" b="0" dirty="0">
+                <a:solidFill>
+                  <a:srgbClr val="9CDCFE"/>
+                </a:solidFill>
+                <a:effectLst/>
+                <a:latin typeface="Consolas" panose="020B0609020204030204" pitchFamily="49" charset="0"/>
+              </a:rPr>
+              <a:t>date</a:t>
+            </a:r>
+            <a:r>
+              <a:rPr lang="en-US" b="0" dirty="0">
+                <a:solidFill>
+                  <a:srgbClr val="569CD6"/>
+                </a:solidFill>
+                <a:effectLst/>
+                <a:latin typeface="Consolas" panose="020B0609020204030204" pitchFamily="49" charset="0"/>
+              </a:rPr>
+              <a:t>}</a:t>
+            </a:r>
+            <a:endParaRPr lang="en-US" b="0" dirty="0">
+              <a:solidFill>
+                <a:srgbClr val="D4D4D4"/>
+              </a:solidFill>
+              <a:effectLst/>
+              <a:latin typeface="Consolas" panose="020B0609020204030204" pitchFamily="49" charset="0"/>
+            </a:endParaRPr>
+          </a:p>
+          <a:p>
+            <a:pPr marL="0" indent="0">
+              <a:buNone/>
+            </a:pPr>
+            <a:r>
+              <a:rPr lang="en-US" b="0" dirty="0">
+                <a:solidFill>
+                  <a:srgbClr val="D4D4D4"/>
+                </a:solidFill>
+                <a:effectLst/>
+                <a:latin typeface="Consolas" panose="020B0609020204030204" pitchFamily="49" charset="0"/>
+              </a:rPr>
+              <a:t>     </a:t>
+            </a:r>
+            <a:r>
+              <a:rPr lang="en-US" b="0" dirty="0">
+                <a:solidFill>
+                  <a:srgbClr val="808080"/>
+                </a:solidFill>
+                <a:effectLst/>
+                <a:latin typeface="Consolas" panose="020B0609020204030204" pitchFamily="49" charset="0"/>
+              </a:rPr>
+              <a:t>&gt;&lt;/</a:t>
+            </a:r>
+            <a:r>
+              <a:rPr lang="en-US" b="0" dirty="0" err="1">
+                <a:solidFill>
+                  <a:srgbClr val="4EC9B0"/>
+                </a:solidFill>
+                <a:effectLst/>
+                <a:latin typeface="Consolas" panose="020B0609020204030204" pitchFamily="49" charset="0"/>
+              </a:rPr>
+              <a:t>ExpenseItem</a:t>
+            </a:r>
+            <a:r>
+              <a:rPr lang="en-US" b="0" dirty="0">
+                <a:solidFill>
+                  <a:srgbClr val="808080"/>
+                </a:solidFill>
+                <a:effectLst/>
+                <a:latin typeface="Consolas" panose="020B0609020204030204" pitchFamily="49" charset="0"/>
+              </a:rPr>
+              <a:t>&gt;</a:t>
+            </a:r>
+            <a:endParaRPr lang="en-US" b="0" dirty="0">
+              <a:solidFill>
+                <a:srgbClr val="D4D4D4"/>
+              </a:solidFill>
+              <a:effectLst/>
+              <a:latin typeface="Consolas" panose="020B0609020204030204" pitchFamily="49" charset="0"/>
+            </a:endParaRPr>
+          </a:p>
+          <a:p>
+            <a:pPr marL="0" indent="0">
+              <a:buNone/>
+            </a:pPr>
+            <a:r>
+              <a:rPr lang="en-CA" dirty="0"/>
+              <a:t>		)</a:t>
+            </a:r>
+          </a:p>
+          <a:p>
+            <a:r>
+              <a:rPr lang="en-CA" dirty="0"/>
+              <a:t>Attributes are passed as an object in component parameter (</a:t>
+            </a:r>
+          </a:p>
+          <a:p>
+            <a:pPr marL="0" indent="0">
+              <a:buNone/>
+            </a:pPr>
+            <a:r>
+              <a:rPr lang="en-CA" b="0" dirty="0">
+                <a:solidFill>
+                  <a:srgbClr val="DCDCAA"/>
+                </a:solidFill>
+                <a:effectLst/>
+                <a:latin typeface="Consolas" panose="020B0609020204030204" pitchFamily="49" charset="0"/>
+              </a:rPr>
+              <a:t>	</a:t>
+            </a:r>
+            <a:r>
+              <a:rPr lang="en-CA" b="0" dirty="0" err="1">
+                <a:solidFill>
+                  <a:srgbClr val="DCDCAA"/>
+                </a:solidFill>
+                <a:effectLst/>
+                <a:latin typeface="Consolas" panose="020B0609020204030204" pitchFamily="49" charset="0"/>
+              </a:rPr>
+              <a:t>ExpenseItem</a:t>
+            </a:r>
+            <a:r>
+              <a:rPr lang="en-CA" b="0" dirty="0">
+                <a:solidFill>
+                  <a:srgbClr val="D4D4D4"/>
+                </a:solidFill>
+                <a:effectLst/>
+                <a:latin typeface="Consolas" panose="020B0609020204030204" pitchFamily="49" charset="0"/>
+              </a:rPr>
+              <a:t>(</a:t>
+            </a:r>
+            <a:r>
+              <a:rPr lang="en-CA" b="0">
+                <a:solidFill>
+                  <a:srgbClr val="9CDCFE"/>
+                </a:solidFill>
+                <a:effectLst/>
+                <a:latin typeface="Consolas" panose="020B0609020204030204" pitchFamily="49" charset="0"/>
+              </a:rPr>
+              <a:t>props</a:t>
+            </a:r>
+            <a:r>
+              <a:rPr lang="en-CA" b="0">
+                <a:solidFill>
+                  <a:srgbClr val="D4D4D4"/>
+                </a:solidFill>
+                <a:effectLst/>
+                <a:latin typeface="Consolas" panose="020B0609020204030204" pitchFamily="49" charset="0"/>
+              </a:rPr>
+              <a:t>)</a:t>
+            </a:r>
+            <a:r>
+              <a:rPr lang="en-CA" b="0" dirty="0">
+                <a:solidFill>
+                  <a:srgbClr val="D4D4D4"/>
+                </a:solidFill>
+                <a:effectLst/>
+                <a:latin typeface="Consolas" panose="020B0609020204030204" pitchFamily="49" charset="0"/>
+              </a:rPr>
+              <a:t>)</a:t>
+            </a:r>
+          </a:p>
+        </p:txBody>
+      </p:sp>
+    </p:spTree>
+    <p:extLst>
+      <p:ext uri="{BB962C8B-B14F-4D97-AF65-F5344CB8AC3E}">
+        <p14:creationId xmlns:p14="http://schemas.microsoft.com/office/powerpoint/2010/main" val="1945974417"/>
       </p:ext>
     </p:extLst>
   </p:cSld>

</xml_diff>